<commit_message>
More tweaks, less data, new example.
</commit_message>
<xml_diff>
--- a/slides/7_linear_regression.pptx
+++ b/slides/7_linear_regression.pptx
@@ -294,7 +294,7 @@
           <a:p>
             <a:fld id="{ED815E1F-C39A-794D-935F-53053862F18C}" type="datetimeFigureOut">
               <a:rPr lang="en-US" smtClean="0"/>
-              <a:t>9/4/14</a:t>
+              <a:t>9/5/14</a:t>
             </a:fld>
             <a:endParaRPr lang="en-US"/>
           </a:p>
@@ -464,7 +464,7 @@
           <a:p>
             <a:fld id="{ED815E1F-C39A-794D-935F-53053862F18C}" type="datetimeFigureOut">
               <a:rPr lang="en-US" smtClean="0"/>
-              <a:t>9/4/14</a:t>
+              <a:t>9/5/14</a:t>
             </a:fld>
             <a:endParaRPr lang="en-US"/>
           </a:p>
@@ -644,7 +644,7 @@
           <a:p>
             <a:fld id="{ED815E1F-C39A-794D-935F-53053862F18C}" type="datetimeFigureOut">
               <a:rPr lang="en-US" smtClean="0"/>
-              <a:t>9/4/14</a:t>
+              <a:t>9/5/14</a:t>
             </a:fld>
             <a:endParaRPr lang="en-US"/>
           </a:p>
@@ -814,7 +814,7 @@
           <a:p>
             <a:fld id="{ED815E1F-C39A-794D-935F-53053862F18C}" type="datetimeFigureOut">
               <a:rPr lang="en-US" smtClean="0"/>
-              <a:t>9/4/14</a:t>
+              <a:t>9/5/14</a:t>
             </a:fld>
             <a:endParaRPr lang="en-US"/>
           </a:p>
@@ -1060,7 +1060,7 @@
           <a:p>
             <a:fld id="{ED815E1F-C39A-794D-935F-53053862F18C}" type="datetimeFigureOut">
               <a:rPr lang="en-US" smtClean="0"/>
-              <a:t>9/4/14</a:t>
+              <a:t>9/5/14</a:t>
             </a:fld>
             <a:endParaRPr lang="en-US"/>
           </a:p>
@@ -1348,7 +1348,7 @@
           <a:p>
             <a:fld id="{ED815E1F-C39A-794D-935F-53053862F18C}" type="datetimeFigureOut">
               <a:rPr lang="en-US" smtClean="0"/>
-              <a:t>9/4/14</a:t>
+              <a:t>9/5/14</a:t>
             </a:fld>
             <a:endParaRPr lang="en-US"/>
           </a:p>
@@ -1770,7 +1770,7 @@
           <a:p>
             <a:fld id="{ED815E1F-C39A-794D-935F-53053862F18C}" type="datetimeFigureOut">
               <a:rPr lang="en-US" smtClean="0"/>
-              <a:t>9/4/14</a:t>
+              <a:t>9/5/14</a:t>
             </a:fld>
             <a:endParaRPr lang="en-US"/>
           </a:p>
@@ -1888,7 +1888,7 @@
           <a:p>
             <a:fld id="{ED815E1F-C39A-794D-935F-53053862F18C}" type="datetimeFigureOut">
               <a:rPr lang="en-US" smtClean="0"/>
-              <a:t>9/4/14</a:t>
+              <a:t>9/5/14</a:t>
             </a:fld>
             <a:endParaRPr lang="en-US"/>
           </a:p>
@@ -1983,7 +1983,7 @@
           <a:p>
             <a:fld id="{ED815E1F-C39A-794D-935F-53053862F18C}" type="datetimeFigureOut">
               <a:rPr lang="en-US" smtClean="0"/>
-              <a:t>9/4/14</a:t>
+              <a:t>9/5/14</a:t>
             </a:fld>
             <a:endParaRPr lang="en-US"/>
           </a:p>
@@ -2260,7 +2260,7 @@
           <a:p>
             <a:fld id="{ED815E1F-C39A-794D-935F-53053862F18C}" type="datetimeFigureOut">
               <a:rPr lang="en-US" smtClean="0"/>
-              <a:t>9/4/14</a:t>
+              <a:t>9/5/14</a:t>
             </a:fld>
             <a:endParaRPr lang="en-US"/>
           </a:p>
@@ -2513,7 +2513,7 @@
           <a:p>
             <a:fld id="{ED815E1F-C39A-794D-935F-53053862F18C}" type="datetimeFigureOut">
               <a:rPr lang="en-US" smtClean="0"/>
-              <a:t>9/4/14</a:t>
+              <a:t>9/5/14</a:t>
             </a:fld>
             <a:endParaRPr lang="en-US"/>
           </a:p>
@@ -2726,7 +2726,7 @@
           <a:p>
             <a:fld id="{ED815E1F-C39A-794D-935F-53053862F18C}" type="datetimeFigureOut">
               <a:rPr lang="en-US" smtClean="0"/>
-              <a:t>9/4/14</a:t>
+              <a:t>9/5/14</a:t>
             </a:fld>
             <a:endParaRPr lang="en-US"/>
           </a:p>
@@ -3157,6 +3157,13 @@
   <p:clrMapOvr>
     <a:masterClrMapping/>
   </p:clrMapOvr>
+  <p:timing>
+    <p:tnLst>
+      <p:par>
+        <p:cTn xmlns:p14="http://schemas.microsoft.com/office/powerpoint/2010/main" id="1" dur="indefinite" restart="never" nodeType="tmRoot"/>
+      </p:par>
+    </p:tnLst>
+  </p:timing>
 </p:sld>
 </file>
 
@@ -3245,6 +3252,13 @@
   <p:clrMapOvr>
     <a:masterClrMapping/>
   </p:clrMapOvr>
+  <p:timing>
+    <p:tnLst>
+      <p:par>
+        <p:cTn xmlns:p14="http://schemas.microsoft.com/office/powerpoint/2010/main" id="1" dur="indefinite" restart="never" nodeType="tmRoot"/>
+      </p:par>
+    </p:tnLst>
+  </p:timing>
 </p:sld>
 </file>
 
@@ -3668,6 +3682,13 @@
   <p:clrMapOvr>
     <a:masterClrMapping/>
   </p:clrMapOvr>
+  <p:timing>
+    <p:tnLst>
+      <p:par>
+        <p:cTn xmlns:p14="http://schemas.microsoft.com/office/powerpoint/2010/main" id="1" dur="indefinite" restart="never" nodeType="tmRoot"/>
+      </p:par>
+    </p:tnLst>
+  </p:timing>
 </p:sld>
 </file>
 
@@ -3754,6 +3775,13 @@
   <p:clrMapOvr>
     <a:masterClrMapping/>
   </p:clrMapOvr>
+  <p:timing>
+    <p:tnLst>
+      <p:par>
+        <p:cTn xmlns:p14="http://schemas.microsoft.com/office/powerpoint/2010/main" id="1" dur="indefinite" restart="never" nodeType="tmRoot"/>
+      </p:par>
+    </p:tnLst>
+  </p:timing>
 </p:sld>
 </file>
 
@@ -3844,6 +3872,13 @@
   <p:clrMapOvr>
     <a:masterClrMapping/>
   </p:clrMapOvr>
+  <p:timing>
+    <p:tnLst>
+      <p:par>
+        <p:cTn xmlns:p14="http://schemas.microsoft.com/office/powerpoint/2010/main" id="1" dur="indefinite" restart="never" nodeType="tmRoot"/>
+      </p:par>
+    </p:tnLst>
+  </p:timing>
 </p:sld>
 </file>
 
@@ -3936,6 +3971,13 @@
   <p:clrMapOvr>
     <a:masterClrMapping/>
   </p:clrMapOvr>
+  <p:timing>
+    <p:tnLst>
+      <p:par>
+        <p:cTn xmlns:p14="http://schemas.microsoft.com/office/powerpoint/2010/main" id="1" dur="indefinite" restart="never" nodeType="tmRoot"/>
+      </p:par>
+    </p:tnLst>
+  </p:timing>
 </p:sld>
 </file>
 
@@ -4026,6 +4068,13 @@
   <p:clrMapOvr>
     <a:masterClrMapping/>
   </p:clrMapOvr>
+  <p:timing>
+    <p:tnLst>
+      <p:par>
+        <p:cTn xmlns:p14="http://schemas.microsoft.com/office/powerpoint/2010/main" id="1" dur="indefinite" restart="never" nodeType="tmRoot"/>
+      </p:par>
+    </p:tnLst>
+  </p:timing>
 </p:sld>
 </file>
 

</xml_diff>